<commit_message>
add git URL to ppt
</commit_message>
<xml_diff>
--- a/ni_hil_automation.pptx
+++ b/ni_hil_automation.pptx
@@ -7055,7 +7055,12 @@
           <a:bodyPr/>
           <a:lstStyle/>
           <a:p>
-            <a:endParaRPr lang="zh-CN" altLang="en-US"/>
+            <a:pPr algn="l"/>
+            <a:r>
+              <a:rPr lang="en-US" altLang="zh-CN" dirty="0"/>
+              <a:t>https://github.com/Jowitt419/HIL_auto</a:t>
+            </a:r>
+            <a:endParaRPr lang="zh-CN" altLang="en-US" dirty="0"/>
           </a:p>
         </p:txBody>
       </p:sp>

</xml_diff>

<commit_message>
updated TestStand Seq and revised HIL_in.csv and ppt
</commit_message>
<xml_diff>
--- a/ni_hil_automation.pptx
+++ b/ni_hil_automation.pptx
@@ -207,7 +207,7 @@
           <a:p>
             <a:fld id="{434C6512-73FC-45AA-A96A-A7B54BB23EBC}" type="datetimeFigureOut">
               <a:rPr lang="zh-CN" altLang="en-US" smtClean="0"/>
-              <a:t>2022/3/31</a:t>
+              <a:t>2022/4/1</a:t>
             </a:fld>
             <a:endParaRPr lang="zh-CN" altLang="en-US"/>
           </a:p>
@@ -712,7 +712,7 @@
           <a:p>
             <a:fld id="{C3B48457-2BFA-4D75-9E75-BBB041F7EA72}" type="datetimeFigureOut">
               <a:rPr lang="zh-CN" altLang="en-US" smtClean="0"/>
-              <a:t>2022/3/31</a:t>
+              <a:t>2022/4/1</a:t>
             </a:fld>
             <a:endParaRPr lang="zh-CN" altLang="en-US"/>
           </a:p>
@@ -910,7 +910,7 @@
           <a:p>
             <a:fld id="{C3B48457-2BFA-4D75-9E75-BBB041F7EA72}" type="datetimeFigureOut">
               <a:rPr lang="zh-CN" altLang="en-US" smtClean="0"/>
-              <a:t>2022/3/31</a:t>
+              <a:t>2022/4/1</a:t>
             </a:fld>
             <a:endParaRPr lang="zh-CN" altLang="en-US"/>
           </a:p>
@@ -1118,7 +1118,7 @@
           <a:p>
             <a:fld id="{C3B48457-2BFA-4D75-9E75-BBB041F7EA72}" type="datetimeFigureOut">
               <a:rPr lang="zh-CN" altLang="en-US" smtClean="0"/>
-              <a:t>2022/3/31</a:t>
+              <a:t>2022/4/1</a:t>
             </a:fld>
             <a:endParaRPr lang="zh-CN" altLang="en-US"/>
           </a:p>
@@ -1316,7 +1316,7 @@
           <a:p>
             <a:fld id="{C3B48457-2BFA-4D75-9E75-BBB041F7EA72}" type="datetimeFigureOut">
               <a:rPr lang="zh-CN" altLang="en-US" smtClean="0"/>
-              <a:t>2022/3/31</a:t>
+              <a:t>2022/4/1</a:t>
             </a:fld>
             <a:endParaRPr lang="zh-CN" altLang="en-US"/>
           </a:p>
@@ -1591,7 +1591,7 @@
           <a:p>
             <a:fld id="{C3B48457-2BFA-4D75-9E75-BBB041F7EA72}" type="datetimeFigureOut">
               <a:rPr lang="zh-CN" altLang="en-US" smtClean="0"/>
-              <a:t>2022/3/31</a:t>
+              <a:t>2022/4/1</a:t>
             </a:fld>
             <a:endParaRPr lang="zh-CN" altLang="en-US"/>
           </a:p>
@@ -1856,7 +1856,7 @@
           <a:p>
             <a:fld id="{C3B48457-2BFA-4D75-9E75-BBB041F7EA72}" type="datetimeFigureOut">
               <a:rPr lang="zh-CN" altLang="en-US" smtClean="0"/>
-              <a:t>2022/3/31</a:t>
+              <a:t>2022/4/1</a:t>
             </a:fld>
             <a:endParaRPr lang="zh-CN" altLang="en-US"/>
           </a:p>
@@ -2268,7 +2268,7 @@
           <a:p>
             <a:fld id="{C3B48457-2BFA-4D75-9E75-BBB041F7EA72}" type="datetimeFigureOut">
               <a:rPr lang="zh-CN" altLang="en-US" smtClean="0"/>
-              <a:t>2022/3/31</a:t>
+              <a:t>2022/4/1</a:t>
             </a:fld>
             <a:endParaRPr lang="zh-CN" altLang="en-US"/>
           </a:p>
@@ -2409,7 +2409,7 @@
           <a:p>
             <a:fld id="{C3B48457-2BFA-4D75-9E75-BBB041F7EA72}" type="datetimeFigureOut">
               <a:rPr lang="zh-CN" altLang="en-US" smtClean="0"/>
-              <a:t>2022/3/31</a:t>
+              <a:t>2022/4/1</a:t>
             </a:fld>
             <a:endParaRPr lang="zh-CN" altLang="en-US"/>
           </a:p>
@@ -2522,7 +2522,7 @@
           <a:p>
             <a:fld id="{C3B48457-2BFA-4D75-9E75-BBB041F7EA72}" type="datetimeFigureOut">
               <a:rPr lang="zh-CN" altLang="en-US" smtClean="0"/>
-              <a:t>2022/3/31</a:t>
+              <a:t>2022/4/1</a:t>
             </a:fld>
             <a:endParaRPr lang="zh-CN" altLang="en-US"/>
           </a:p>
@@ -2833,7 +2833,7 @@
           <a:p>
             <a:fld id="{C3B48457-2BFA-4D75-9E75-BBB041F7EA72}" type="datetimeFigureOut">
               <a:rPr lang="zh-CN" altLang="en-US" smtClean="0"/>
-              <a:t>2022/3/31</a:t>
+              <a:t>2022/4/1</a:t>
             </a:fld>
             <a:endParaRPr lang="zh-CN" altLang="en-US"/>
           </a:p>
@@ -3121,7 +3121,7 @@
           <a:p>
             <a:fld id="{C3B48457-2BFA-4D75-9E75-BBB041F7EA72}" type="datetimeFigureOut">
               <a:rPr lang="zh-CN" altLang="en-US" smtClean="0"/>
-              <a:t>2022/3/31</a:t>
+              <a:t>2022/4/1</a:t>
             </a:fld>
             <a:endParaRPr lang="zh-CN" altLang="en-US"/>
           </a:p>
@@ -3362,7 +3362,7 @@
           <a:p>
             <a:fld id="{C3B48457-2BFA-4D75-9E75-BBB041F7EA72}" type="datetimeFigureOut">
               <a:rPr lang="zh-CN" altLang="en-US" smtClean="0"/>
-              <a:t>2022/3/31</a:t>
+              <a:t>2022/4/1</a:t>
             </a:fld>
             <a:endParaRPr lang="zh-CN" altLang="en-US"/>
           </a:p>
@@ -6624,8 +6624,8 @@
         </p:blipFill>
         <p:spPr>
           <a:xfrm>
-            <a:off x="5589302" y="1452717"/>
-            <a:ext cx="6072091" cy="5111748"/>
+            <a:off x="5577840" y="1452716"/>
+            <a:ext cx="6083553" cy="5121397"/>
           </a:xfrm>
           <a:prstGeom prst="rect">
             <a:avLst/>
@@ -6646,7 +6646,7 @@
         </p:nvSpPr>
         <p:spPr>
           <a:xfrm>
-            <a:off x="5727289" y="1597744"/>
+            <a:off x="5801926" y="1597744"/>
             <a:ext cx="1374059" cy="1433050"/>
           </a:xfrm>
           <a:prstGeom prst="rect">
@@ -6732,7 +6732,7 @@
         </p:nvSpPr>
         <p:spPr>
           <a:xfrm>
-            <a:off x="9674942" y="1597744"/>
+            <a:off x="9712397" y="1522543"/>
             <a:ext cx="1374059" cy="1433050"/>
           </a:xfrm>
           <a:prstGeom prst="rect">
@@ -6829,7 +6829,7 @@
         </p:nvSpPr>
         <p:spPr>
           <a:xfrm>
-            <a:off x="7788377" y="1624783"/>
+            <a:off x="7788377" y="1522543"/>
             <a:ext cx="1274173" cy="838198"/>
           </a:xfrm>
           <a:prstGeom prst="rect">
@@ -6938,7 +6938,7 @@
         </p:nvSpPr>
         <p:spPr>
           <a:xfrm>
-            <a:off x="7367600" y="2978004"/>
+            <a:off x="7400170" y="2978004"/>
             <a:ext cx="1931257" cy="450996"/>
           </a:xfrm>
           <a:prstGeom prst="roundRect">

</xml_diff>

<commit_message>
two questions in pitch solved
</commit_message>
<xml_diff>
--- a/ni_hil_automation.pptx
+++ b/ni_hil_automation.pptx
@@ -5,7 +5,7 @@
     <p:sldMasterId id="2147483648" r:id="rId1"/>
   </p:sldMasterIdLst>
   <p:notesMasterIdLst>
-    <p:notesMasterId r:id="rId13"/>
+    <p:notesMasterId r:id="rId15"/>
   </p:notesMasterIdLst>
   <p:sldIdLst>
     <p:sldId id="256" r:id="rId2"/>
@@ -16,9 +16,11 @@
     <p:sldId id="259" r:id="rId7"/>
     <p:sldId id="266" r:id="rId8"/>
     <p:sldId id="264" r:id="rId9"/>
-    <p:sldId id="267" r:id="rId10"/>
-    <p:sldId id="258" r:id="rId11"/>
-    <p:sldId id="257" r:id="rId12"/>
+    <p:sldId id="268" r:id="rId10"/>
+    <p:sldId id="269" r:id="rId11"/>
+    <p:sldId id="267" r:id="rId12"/>
+    <p:sldId id="258" r:id="rId13"/>
+    <p:sldId id="257" r:id="rId14"/>
   </p:sldIdLst>
   <p:sldSz cx="12192000" cy="6858000"/>
   <p:notesSz cx="6858000" cy="9144000"/>
@@ -207,7 +209,7 @@
           <a:p>
             <a:fld id="{434C6512-73FC-45AA-A96A-A7B54BB23EBC}" type="datetimeFigureOut">
               <a:rPr lang="zh-CN" altLang="en-US" smtClean="0"/>
-              <a:t>2022/4/1</a:t>
+              <a:t>2022/4/2</a:t>
             </a:fld>
             <a:endParaRPr lang="zh-CN" altLang="en-US"/>
           </a:p>
@@ -712,7 +714,7 @@
           <a:p>
             <a:fld id="{C3B48457-2BFA-4D75-9E75-BBB041F7EA72}" type="datetimeFigureOut">
               <a:rPr lang="zh-CN" altLang="en-US" smtClean="0"/>
-              <a:t>2022/4/1</a:t>
+              <a:t>2022/4/2</a:t>
             </a:fld>
             <a:endParaRPr lang="zh-CN" altLang="en-US"/>
           </a:p>
@@ -910,7 +912,7 @@
           <a:p>
             <a:fld id="{C3B48457-2BFA-4D75-9E75-BBB041F7EA72}" type="datetimeFigureOut">
               <a:rPr lang="zh-CN" altLang="en-US" smtClean="0"/>
-              <a:t>2022/4/1</a:t>
+              <a:t>2022/4/2</a:t>
             </a:fld>
             <a:endParaRPr lang="zh-CN" altLang="en-US"/>
           </a:p>
@@ -1118,7 +1120,7 @@
           <a:p>
             <a:fld id="{C3B48457-2BFA-4D75-9E75-BBB041F7EA72}" type="datetimeFigureOut">
               <a:rPr lang="zh-CN" altLang="en-US" smtClean="0"/>
-              <a:t>2022/4/1</a:t>
+              <a:t>2022/4/2</a:t>
             </a:fld>
             <a:endParaRPr lang="zh-CN" altLang="en-US"/>
           </a:p>
@@ -1316,7 +1318,7 @@
           <a:p>
             <a:fld id="{C3B48457-2BFA-4D75-9E75-BBB041F7EA72}" type="datetimeFigureOut">
               <a:rPr lang="zh-CN" altLang="en-US" smtClean="0"/>
-              <a:t>2022/4/1</a:t>
+              <a:t>2022/4/2</a:t>
             </a:fld>
             <a:endParaRPr lang="zh-CN" altLang="en-US"/>
           </a:p>
@@ -1591,7 +1593,7 @@
           <a:p>
             <a:fld id="{C3B48457-2BFA-4D75-9E75-BBB041F7EA72}" type="datetimeFigureOut">
               <a:rPr lang="zh-CN" altLang="en-US" smtClean="0"/>
-              <a:t>2022/4/1</a:t>
+              <a:t>2022/4/2</a:t>
             </a:fld>
             <a:endParaRPr lang="zh-CN" altLang="en-US"/>
           </a:p>
@@ -1856,7 +1858,7 @@
           <a:p>
             <a:fld id="{C3B48457-2BFA-4D75-9E75-BBB041F7EA72}" type="datetimeFigureOut">
               <a:rPr lang="zh-CN" altLang="en-US" smtClean="0"/>
-              <a:t>2022/4/1</a:t>
+              <a:t>2022/4/2</a:t>
             </a:fld>
             <a:endParaRPr lang="zh-CN" altLang="en-US"/>
           </a:p>
@@ -2268,7 +2270,7 @@
           <a:p>
             <a:fld id="{C3B48457-2BFA-4D75-9E75-BBB041F7EA72}" type="datetimeFigureOut">
               <a:rPr lang="zh-CN" altLang="en-US" smtClean="0"/>
-              <a:t>2022/4/1</a:t>
+              <a:t>2022/4/2</a:t>
             </a:fld>
             <a:endParaRPr lang="zh-CN" altLang="en-US"/>
           </a:p>
@@ -2409,7 +2411,7 @@
           <a:p>
             <a:fld id="{C3B48457-2BFA-4D75-9E75-BBB041F7EA72}" type="datetimeFigureOut">
               <a:rPr lang="zh-CN" altLang="en-US" smtClean="0"/>
-              <a:t>2022/4/1</a:t>
+              <a:t>2022/4/2</a:t>
             </a:fld>
             <a:endParaRPr lang="zh-CN" altLang="en-US"/>
           </a:p>
@@ -2522,7 +2524,7 @@
           <a:p>
             <a:fld id="{C3B48457-2BFA-4D75-9E75-BBB041F7EA72}" type="datetimeFigureOut">
               <a:rPr lang="zh-CN" altLang="en-US" smtClean="0"/>
-              <a:t>2022/4/1</a:t>
+              <a:t>2022/4/2</a:t>
             </a:fld>
             <a:endParaRPr lang="zh-CN" altLang="en-US"/>
           </a:p>
@@ -2833,7 +2835,7 @@
           <a:p>
             <a:fld id="{C3B48457-2BFA-4D75-9E75-BBB041F7EA72}" type="datetimeFigureOut">
               <a:rPr lang="zh-CN" altLang="en-US" smtClean="0"/>
-              <a:t>2022/4/1</a:t>
+              <a:t>2022/4/2</a:t>
             </a:fld>
             <a:endParaRPr lang="zh-CN" altLang="en-US"/>
           </a:p>
@@ -3121,7 +3123,7 @@
           <a:p>
             <a:fld id="{C3B48457-2BFA-4D75-9E75-BBB041F7EA72}" type="datetimeFigureOut">
               <a:rPr lang="zh-CN" altLang="en-US" smtClean="0"/>
-              <a:t>2022/4/1</a:t>
+              <a:t>2022/4/2</a:t>
             </a:fld>
             <a:endParaRPr lang="zh-CN" altLang="en-US"/>
           </a:p>
@@ -3362,7 +3364,7 @@
           <a:p>
             <a:fld id="{C3B48457-2BFA-4D75-9E75-BBB041F7EA72}" type="datetimeFigureOut">
               <a:rPr lang="zh-CN" altLang="en-US" smtClean="0"/>
-              <a:t>2022/4/1</a:t>
+              <a:t>2022/4/2</a:t>
             </a:fld>
             <a:endParaRPr lang="zh-CN" altLang="en-US"/>
           </a:p>
@@ -4092,6 +4094,229 @@
 </file>
 
 <file path=ppt/slides/slide10.xml><?xml version="1.0" encoding="utf-8"?>
+<p:sld xmlns:a="http://schemas.openxmlformats.org/drawingml/2006/main" xmlns:r="http://schemas.openxmlformats.org/officeDocument/2006/relationships" xmlns:p="http://schemas.openxmlformats.org/presentationml/2006/main">
+  <p:cSld>
+    <p:spTree>
+      <p:nvGrpSpPr>
+        <p:cNvPr id="1" name=""/>
+        <p:cNvGrpSpPr/>
+        <p:nvPr/>
+      </p:nvGrpSpPr>
+      <p:grpSpPr>
+        <a:xfrm>
+          <a:off x="0" y="0"/>
+          <a:ext cx="0" cy="0"/>
+          <a:chOff x="0" y="0"/>
+          <a:chExt cx="0" cy="0"/>
+        </a:xfrm>
+      </p:grpSpPr>
+      <p:pic>
+        <p:nvPicPr>
+          <p:cNvPr id="6" name="图片 5">
+            <a:extLst>
+              <a:ext uri="{FF2B5EF4-FFF2-40B4-BE49-F238E27FC236}">
+                <a16:creationId xmlns:a16="http://schemas.microsoft.com/office/drawing/2014/main" id="{13CF17CD-1A94-4465-A44B-DA9068475F8F}"/>
+              </a:ext>
+            </a:extLst>
+          </p:cNvPr>
+          <p:cNvPicPr>
+            <a:picLocks noChangeAspect="1"/>
+          </p:cNvPicPr>
+          <p:nvPr/>
+        </p:nvPicPr>
+        <p:blipFill>
+          <a:blip r:embed="rId2"/>
+          <a:stretch>
+            <a:fillRect/>
+          </a:stretch>
+        </p:blipFill>
+        <p:spPr>
+          <a:xfrm>
+            <a:off x="493395" y="1183768"/>
+            <a:ext cx="7658100" cy="5434202"/>
+          </a:xfrm>
+          <a:prstGeom prst="rect">
+            <a:avLst/>
+          </a:prstGeom>
+        </p:spPr>
+      </p:pic>
+      <p:pic>
+        <p:nvPicPr>
+          <p:cNvPr id="8" name="图片 7">
+            <a:extLst>
+              <a:ext uri="{FF2B5EF4-FFF2-40B4-BE49-F238E27FC236}">
+                <a16:creationId xmlns:a16="http://schemas.microsoft.com/office/drawing/2014/main" id="{C98B4686-D6E4-4F8D-B108-9DD091A6341C}"/>
+              </a:ext>
+            </a:extLst>
+          </p:cNvPr>
+          <p:cNvPicPr>
+            <a:picLocks noChangeAspect="1"/>
+          </p:cNvPicPr>
+          <p:nvPr/>
+        </p:nvPicPr>
+        <p:blipFill>
+          <a:blip r:embed="rId3"/>
+          <a:stretch>
+            <a:fillRect/>
+          </a:stretch>
+        </p:blipFill>
+        <p:spPr>
+          <a:xfrm>
+            <a:off x="4067175" y="4772025"/>
+            <a:ext cx="8124825" cy="2085975"/>
+          </a:xfrm>
+          <a:prstGeom prst="rect">
+            <a:avLst/>
+          </a:prstGeom>
+        </p:spPr>
+      </p:pic>
+      <p:sp>
+        <p:nvSpPr>
+          <p:cNvPr id="9" name="文本框 8">
+            <a:extLst>
+              <a:ext uri="{FF2B5EF4-FFF2-40B4-BE49-F238E27FC236}">
+                <a16:creationId xmlns:a16="http://schemas.microsoft.com/office/drawing/2014/main" id="{74EF1D62-4208-4A50-A9A8-ADC8879507A0}"/>
+              </a:ext>
+            </a:extLst>
+          </p:cNvPr>
+          <p:cNvSpPr txBox="1"/>
+          <p:nvPr/>
+        </p:nvSpPr>
+        <p:spPr>
+          <a:xfrm>
+            <a:off x="493395" y="148590"/>
+            <a:ext cx="5602605" cy="369332"/>
+          </a:xfrm>
+          <a:prstGeom prst="rect">
+            <a:avLst/>
+          </a:prstGeom>
+          <a:noFill/>
+        </p:spPr>
+        <p:txBody>
+          <a:bodyPr wrap="square" rtlCol="0">
+            <a:spAutoFit/>
+          </a:bodyPr>
+          <a:lstStyle/>
+          <a:p>
+            <a:r>
+              <a:rPr lang="en-US" altLang="zh-CN" dirty="0" err="1"/>
+              <a:t>Virtualenv</a:t>
+            </a:r>
+            <a:r>
+              <a:rPr lang="en-US" altLang="zh-CN" dirty="0"/>
+              <a:t> Tools</a:t>
+            </a:r>
+            <a:r>
+              <a:rPr lang="zh-CN" altLang="en-US" dirty="0"/>
+              <a:t>使用</a:t>
+            </a:r>
+          </a:p>
+        </p:txBody>
+      </p:sp>
+    </p:spTree>
+    <p:extLst>
+      <p:ext uri="{BB962C8B-B14F-4D97-AF65-F5344CB8AC3E}">
+        <p14:creationId xmlns:p14="http://schemas.microsoft.com/office/powerpoint/2010/main" val="4070804084"/>
+      </p:ext>
+    </p:extLst>
+  </p:cSld>
+  <p:clrMapOvr>
+    <a:masterClrMapping/>
+  </p:clrMapOvr>
+</p:sld>
+</file>
+
+<file path=ppt/slides/slide11.xml><?xml version="1.0" encoding="utf-8"?>
+<p:sld xmlns:a="http://schemas.openxmlformats.org/drawingml/2006/main" xmlns:r="http://schemas.openxmlformats.org/officeDocument/2006/relationships" xmlns:p="http://schemas.openxmlformats.org/presentationml/2006/main">
+  <p:cSld>
+    <p:spTree>
+      <p:nvGrpSpPr>
+        <p:cNvPr id="1" name=""/>
+        <p:cNvGrpSpPr/>
+        <p:nvPr/>
+      </p:nvGrpSpPr>
+      <p:grpSpPr>
+        <a:xfrm>
+          <a:off x="0" y="0"/>
+          <a:ext cx="0" cy="0"/>
+          <a:chOff x="0" y="0"/>
+          <a:chExt cx="0" cy="0"/>
+        </a:xfrm>
+      </p:grpSpPr>
+      <p:sp>
+        <p:nvSpPr>
+          <p:cNvPr id="4" name="标题 3">
+            <a:extLst>
+              <a:ext uri="{FF2B5EF4-FFF2-40B4-BE49-F238E27FC236}">
+                <a16:creationId xmlns:a16="http://schemas.microsoft.com/office/drawing/2014/main" id="{7AB77BAB-C2C1-433D-BD3D-F53EBF465449}"/>
+              </a:ext>
+            </a:extLst>
+          </p:cNvPr>
+          <p:cNvSpPr>
+            <a:spLocks noGrp="1"/>
+          </p:cNvSpPr>
+          <p:nvPr>
+            <p:ph type="ctrTitle"/>
+          </p:nvPr>
+        </p:nvSpPr>
+        <p:spPr/>
+        <p:txBody>
+          <a:bodyPr/>
+          <a:lstStyle/>
+          <a:p>
+            <a:pPr algn="l"/>
+            <a:r>
+              <a:rPr lang="en-US" altLang="zh-CN" dirty="0"/>
+              <a:t>Backup</a:t>
+            </a:r>
+            <a:endParaRPr lang="zh-CN" altLang="en-US" dirty="0"/>
+          </a:p>
+        </p:txBody>
+      </p:sp>
+      <p:sp>
+        <p:nvSpPr>
+          <p:cNvPr id="5" name="副标题 4">
+            <a:extLst>
+              <a:ext uri="{FF2B5EF4-FFF2-40B4-BE49-F238E27FC236}">
+                <a16:creationId xmlns:a16="http://schemas.microsoft.com/office/drawing/2014/main" id="{D3AA36B6-E93B-4182-8505-27251F070B09}"/>
+              </a:ext>
+            </a:extLst>
+          </p:cNvPr>
+          <p:cNvSpPr>
+            <a:spLocks noGrp="1"/>
+          </p:cNvSpPr>
+          <p:nvPr>
+            <p:ph type="subTitle" idx="1"/>
+          </p:nvPr>
+        </p:nvSpPr>
+        <p:spPr/>
+        <p:txBody>
+          <a:bodyPr/>
+          <a:lstStyle/>
+          <a:p>
+            <a:pPr algn="l"/>
+            <a:r>
+              <a:rPr lang="en-US" altLang="zh-CN" dirty="0"/>
+              <a:t>https://github.com/Jowitt419/HIL_auto</a:t>
+            </a:r>
+            <a:endParaRPr lang="zh-CN" altLang="en-US" dirty="0"/>
+          </a:p>
+        </p:txBody>
+      </p:sp>
+    </p:spTree>
+    <p:extLst>
+      <p:ext uri="{BB962C8B-B14F-4D97-AF65-F5344CB8AC3E}">
+        <p14:creationId xmlns:p14="http://schemas.microsoft.com/office/powerpoint/2010/main" val="1161370372"/>
+      </p:ext>
+    </p:extLst>
+  </p:cSld>
+  <p:clrMapOvr>
+    <a:masterClrMapping/>
+  </p:clrMapOvr>
+</p:sld>
+</file>
+
+<file path=ppt/slides/slide12.xml><?xml version="1.0" encoding="utf-8"?>
 <p:sld xmlns:a="http://schemas.openxmlformats.org/drawingml/2006/main" xmlns:r="http://schemas.openxmlformats.org/officeDocument/2006/relationships" xmlns:p="http://schemas.openxmlformats.org/presentationml/2006/main">
   <p:cSld>
     <p:spTree>
@@ -4874,7 +5099,7 @@
 </p:sld>
 </file>
 
-<file path=ppt/slides/slide11.xml><?xml version="1.0" encoding="utf-8"?>
+<file path=ppt/slides/slide13.xml><?xml version="1.0" encoding="utf-8"?>
 <p:sld xmlns:a="http://schemas.openxmlformats.org/drawingml/2006/main" xmlns:r="http://schemas.openxmlformats.org/officeDocument/2006/relationships" xmlns:p="http://schemas.openxmlformats.org/presentationml/2006/main">
   <p:cSld>
     <p:spTree>
@@ -7006,10 +7231,10 @@
       </p:grpSpPr>
       <p:sp>
         <p:nvSpPr>
-          <p:cNvPr id="4" name="标题 3">
-            <a:extLst>
-              <a:ext uri="{FF2B5EF4-FFF2-40B4-BE49-F238E27FC236}">
-                <a16:creationId xmlns:a16="http://schemas.microsoft.com/office/drawing/2014/main" id="{7AB77BAB-C2C1-433D-BD3D-F53EBF465449}"/>
+          <p:cNvPr id="2" name="标题 1">
+            <a:extLst>
+              <a:ext uri="{FF2B5EF4-FFF2-40B4-BE49-F238E27FC236}">
+                <a16:creationId xmlns:a16="http://schemas.microsoft.com/office/drawing/2014/main" id="{E89AC4AE-483D-44C9-9AB8-DA180DFADFE9}"/>
               </a:ext>
             </a:extLst>
           </p:cNvPr>
@@ -7017,7 +7242,7 @@
             <a:spLocks noGrp="1"/>
           </p:cNvSpPr>
           <p:nvPr>
-            <p:ph type="ctrTitle"/>
+            <p:ph type="title"/>
           </p:nvPr>
         </p:nvSpPr>
         <p:spPr/>
@@ -7025,10 +7250,9 @@
           <a:bodyPr/>
           <a:lstStyle/>
           <a:p>
-            <a:pPr algn="l"/>
             <a:r>
               <a:rPr lang="en-US" altLang="zh-CN" dirty="0"/>
-              <a:t>Backup</a:t>
+              <a:t>Q&amp;A</a:t>
             </a:r>
             <a:endParaRPr lang="zh-CN" altLang="en-US" dirty="0"/>
           </a:p>
@@ -7036,10 +7260,10 @@
       </p:sp>
       <p:sp>
         <p:nvSpPr>
-          <p:cNvPr id="5" name="副标题 4">
-            <a:extLst>
-              <a:ext uri="{FF2B5EF4-FFF2-40B4-BE49-F238E27FC236}">
-                <a16:creationId xmlns:a16="http://schemas.microsoft.com/office/drawing/2014/main" id="{D3AA36B6-E93B-4182-8505-27251F070B09}"/>
+          <p:cNvPr id="3" name="内容占位符 2">
+            <a:extLst>
+              <a:ext uri="{FF2B5EF4-FFF2-40B4-BE49-F238E27FC236}">
+                <a16:creationId xmlns:a16="http://schemas.microsoft.com/office/drawing/2014/main" id="{52F97CB2-59E2-4D79-A6B3-9B253CB5C97B}"/>
               </a:ext>
             </a:extLst>
           </p:cNvPr>
@@ -7047,18 +7271,165 @@
             <a:spLocks noGrp="1"/>
           </p:cNvSpPr>
           <p:nvPr>
-            <p:ph type="subTitle" idx="1"/>
+            <p:ph idx="1"/>
           </p:nvPr>
         </p:nvSpPr>
         <p:spPr/>
         <p:txBody>
-          <a:bodyPr/>
+          <a:bodyPr>
+            <a:normAutofit lnSpcReduction="10000"/>
+          </a:bodyPr>
           <a:lstStyle/>
           <a:p>
-            <a:pPr algn="l"/>
+            <a:r>
+              <a:rPr lang="zh-CN" altLang="en-US" dirty="0"/>
+              <a:t>郑昊</a:t>
+            </a:r>
+            <a:endParaRPr lang="en-US" altLang="zh-CN" dirty="0"/>
+          </a:p>
+          <a:p>
+            <a:pPr lvl="1"/>
+            <a:r>
+              <a:rPr lang="zh-CN" altLang="en-US" dirty="0"/>
+              <a:t>介绍下</a:t>
+            </a:r>
+            <a:r>
+              <a:rPr lang="en-US" altLang="zh-CN" dirty="0" err="1"/>
+              <a:t>Teststand</a:t>
+            </a:r>
+            <a:r>
+              <a:rPr lang="zh-CN" altLang="en-US" dirty="0"/>
+              <a:t>和</a:t>
+            </a:r>
             <a:r>
               <a:rPr lang="en-US" altLang="zh-CN" dirty="0"/>
-              <a:t>https://github.com/Jowitt419/HIL_auto</a:t>
+              <a:t>Diadem</a:t>
+            </a:r>
+            <a:r>
+              <a:rPr lang="zh-CN" altLang="en-US" dirty="0"/>
+              <a:t>在试验数据处理或试验结果判定方面的</a:t>
+            </a:r>
+            <a:endParaRPr lang="en-US" altLang="zh-CN" dirty="0"/>
+          </a:p>
+          <a:p>
+            <a:pPr lvl="1"/>
+            <a:r>
+              <a:rPr lang="en-US" altLang="zh-CN" dirty="0" err="1"/>
+              <a:t>Teststand</a:t>
+            </a:r>
+            <a:r>
+              <a:rPr lang="zh-CN" altLang="en-US" dirty="0"/>
+              <a:t>是否可以通过编程实现根据前一段用例执行后的结果选择下一个要执行的用例优势</a:t>
+            </a:r>
+            <a:endParaRPr lang="en-US" altLang="zh-CN" dirty="0"/>
+          </a:p>
+          <a:p>
+            <a:r>
+              <a:rPr lang="zh-CN" altLang="en-US" dirty="0"/>
+              <a:t>顾嘉辉</a:t>
+            </a:r>
+            <a:endParaRPr lang="en-US" altLang="zh-CN" dirty="0"/>
+          </a:p>
+          <a:p>
+            <a:pPr lvl="1"/>
+            <a:r>
+              <a:rPr lang="en-US" altLang="zh-CN" dirty="0" err="1"/>
+              <a:t>TestStand</a:t>
+            </a:r>
+            <a:r>
+              <a:rPr lang="zh-CN" altLang="en-US" dirty="0"/>
+              <a:t>配置</a:t>
+            </a:r>
+            <a:r>
+              <a:rPr lang="en-US" altLang="zh-CN" dirty="0"/>
+              <a:t>Python</a:t>
+            </a:r>
+            <a:r>
+              <a:rPr lang="zh-CN" altLang="en-US" dirty="0"/>
+              <a:t>后出现卡顿，死机情况：</a:t>
+            </a:r>
+            <a:endParaRPr lang="en-US" altLang="zh-CN" dirty="0"/>
+          </a:p>
+          <a:p>
+            <a:pPr lvl="2"/>
+            <a:r>
+              <a:rPr lang="zh-CN" altLang="en-US" dirty="0"/>
+              <a:t>已解决：</a:t>
+            </a:r>
+            <a:endParaRPr lang="en-US" altLang="zh-CN" dirty="0"/>
+          </a:p>
+          <a:p>
+            <a:pPr lvl="3"/>
+            <a:r>
+              <a:rPr lang="en-US" altLang="zh-CN" dirty="0"/>
+              <a:t>https://knowledge.ni.com/KnowledgeArticleDetails?id=kA00Z000000g0jeSAA&amp;l=zh-CN</a:t>
+            </a:r>
+          </a:p>
+          <a:p>
+            <a:pPr lvl="3"/>
+            <a:r>
+              <a:rPr lang="en-US" altLang="zh-CN" dirty="0"/>
+              <a:t>https://knowledge.ni.com/KnowledgeArticleDetails?id=kA03q000000YITnCAO&amp;l=zh-CN</a:t>
+            </a:r>
+            <a:r>
+              <a:rPr lang="zh-CN" altLang="en-US" dirty="0"/>
+              <a:t>）</a:t>
+            </a:r>
+            <a:endParaRPr lang="en-US" altLang="zh-CN" dirty="0"/>
+          </a:p>
+          <a:p>
+            <a:pPr lvl="1"/>
+            <a:r>
+              <a:rPr lang="en-US" altLang="zh-CN" dirty="0" err="1"/>
+              <a:t>TestStand</a:t>
+            </a:r>
+            <a:r>
+              <a:rPr lang="zh-CN" altLang="en-US" dirty="0"/>
+              <a:t>演示一行一行读取</a:t>
+            </a:r>
+            <a:r>
+              <a:rPr lang="en-US" altLang="zh-CN" dirty="0"/>
+              <a:t>csv</a:t>
+            </a:r>
+            <a:r>
+              <a:rPr lang="zh-CN" altLang="en-US" dirty="0"/>
+              <a:t>的</a:t>
+            </a:r>
+            <a:r>
+              <a:rPr lang="en-US" altLang="zh-CN" dirty="0" err="1"/>
+              <a:t>src</a:t>
+            </a:r>
+            <a:r>
+              <a:rPr lang="zh-CN" altLang="en-US" dirty="0"/>
+              <a:t>示例</a:t>
+            </a:r>
+            <a:endParaRPr lang="en-US" altLang="zh-CN" dirty="0"/>
+          </a:p>
+          <a:p>
+            <a:pPr lvl="2"/>
+            <a:r>
+              <a:rPr lang="zh-CN" altLang="en-US" dirty="0"/>
+              <a:t>已解决：</a:t>
+            </a:r>
+            <a:endParaRPr lang="en-US" altLang="zh-CN" dirty="0"/>
+          </a:p>
+          <a:p>
+            <a:pPr lvl="3"/>
+            <a:r>
+              <a:rPr lang="en-US" altLang="zh-CN" dirty="0"/>
+              <a:t>See </a:t>
+            </a:r>
+            <a:r>
+              <a:rPr lang="en-US" altLang="zh-CN" dirty="0" err="1"/>
+              <a:t>jiahui_stimu.nivsstimprof</a:t>
+            </a:r>
+            <a:r>
+              <a:rPr lang="en-US" altLang="zh-CN" dirty="0"/>
+              <a:t> &amp; </a:t>
+            </a:r>
+            <a:r>
+              <a:rPr lang="en-US" altLang="zh-CN" dirty="0" err="1"/>
+              <a:t>jiahui_stimu.nivsseq</a:t>
             </a:r>
             <a:endParaRPr lang="zh-CN" altLang="en-US" dirty="0"/>
           </a:p>
@@ -7067,7 +7438,7 @@
     </p:spTree>
     <p:extLst>
       <p:ext uri="{BB962C8B-B14F-4D97-AF65-F5344CB8AC3E}">
-        <p14:creationId xmlns:p14="http://schemas.microsoft.com/office/powerpoint/2010/main" val="1161370372"/>
+        <p14:creationId xmlns:p14="http://schemas.microsoft.com/office/powerpoint/2010/main" val="1134245542"/>
       </p:ext>
     </p:extLst>
   </p:cSld>

</xml_diff>